<commit_message>
Minor updates to slides, add pdf for browser view
</commit_message>
<xml_diff>
--- a/Visual Data Science.pptx
+++ b/Visual Data Science.pptx
@@ -2918,7 +2918,7 @@
               </a:spcBef>
               <a:buNone/>
             </a:pPr>
-            <a:endParaRPr/>
+            <a:endParaRPr dirty="0"/>
           </a:p>
         </p:txBody>
       </p:sp>
@@ -3321,7 +3321,7 @@
         <p:spPr>
           <a:xfrm>
             <a:off x="1371600" y="1143000"/>
-            <a:ext cx="4114800" cy="3086099"/>
+            <a:ext cx="4114800" cy="3086100"/>
           </a:xfrm>
           <a:custGeom>
             <a:avLst/>
@@ -10831,7 +10831,7 @@
               <a:buNone/>
             </a:pPr>
             <a:r>
-              <a:rPr lang="en-US"/>
+              <a:rPr lang="en-US" dirty="0"/>
               <a:t>Visual Data Science</a:t>
             </a:r>
           </a:p>
@@ -12379,9 +12379,6 @@
           <a:lstStyle/>
           <a:p>
             <a:pPr marL="0" marR="0" lvl="0" indent="0" algn="ctr" rtl="0">
-              <a:lnSpc>
-                <a:spcPct val="120000"/>
-              </a:lnSpc>
               <a:spcBef>
                 <a:spcPts val="0"/>
               </a:spcBef>
@@ -12389,7 +12386,7 @@
               <a:buNone/>
             </a:pPr>
             <a:r>
-              <a:rPr lang="en-US" sz="15000">
+              <a:rPr lang="en-US" sz="12500" dirty="0" smtClean="0">
                 <a:solidFill>
                   <a:schemeClr val="lt1"/>
                 </a:solidFill>
@@ -12398,7 +12395,31 @@
                 <a:cs typeface="Cabin"/>
                 <a:sym typeface="Cabin"/>
               </a:rPr>
-              <a:t>Practical Exercise 1</a:t>
+              <a:t>“Homework”</a:t>
+            </a:r>
+            <a:r>
+              <a:rPr lang="en-US" sz="15000" dirty="0" smtClean="0">
+                <a:solidFill>
+                  <a:schemeClr val="lt1"/>
+                </a:solidFill>
+                <a:latin typeface="Cabin"/>
+                <a:ea typeface="Cabin"/>
+                <a:cs typeface="Cabin"/>
+                <a:sym typeface="Cabin"/>
+              </a:rPr>
+              <a:t> Exercise </a:t>
+            </a:r>
+            <a:r>
+              <a:rPr lang="en-US" sz="15000" dirty="0">
+                <a:solidFill>
+                  <a:schemeClr val="lt1"/>
+                </a:solidFill>
+                <a:latin typeface="Cabin"/>
+                <a:ea typeface="Cabin"/>
+                <a:cs typeface="Cabin"/>
+                <a:sym typeface="Cabin"/>
+              </a:rPr>
+              <a:t>1</a:t>
             </a:r>
           </a:p>
         </p:txBody>
@@ -12575,7 +12596,7 @@
               <a:t>Scrape.R</a:t>
             </a:r>
             <a:r>
-              <a:rPr lang="en-US" sz="2400" b="1">
+              <a:rPr lang="en-US" sz="2400" b="1" dirty="0">
                 <a:solidFill>
                   <a:srgbClr val="F3F3F3"/>
                 </a:solidFill>
@@ -12587,7 +12608,7 @@
               <a:t>" </a:t>
             </a:r>
             <a:r>
-              <a:rPr lang="en-US" sz="2400" b="1" smtClean="0">
+              <a:rPr lang="en-US" sz="2400" b="1" dirty="0" smtClean="0">
                 <a:solidFill>
                   <a:srgbClr val="F3F3F3"/>
                 </a:solidFill>
@@ -12599,19 +12620,19 @@
               <a:t>@</a:t>
             </a:r>
             <a:r>
-              <a:rPr lang="en-US" sz="2400" b="1" smtClean="0">
+              <a:rPr lang="en-US" sz="2400" b="1" dirty="0" smtClean="0">
                 <a:hlinkClick r:id="rId4"/>
               </a:rPr>
               <a:t>https</a:t>
             </a:r>
             <a:r>
-              <a:rPr lang="en-US" sz="2400" b="1">
+              <a:rPr lang="en-US" sz="2400" b="1" dirty="0">
                 <a:hlinkClick r:id="rId4"/>
               </a:rPr>
               <a:t>://goo.gl/z6OqUS</a:t>
             </a:r>
             <a:r>
-              <a:rPr lang="en-US" sz="2400" b="1" smtClean="0">
+              <a:rPr lang="en-US" sz="2400" b="1" dirty="0" smtClean="0">
                 <a:solidFill>
                   <a:srgbClr val="4A86E8"/>
                 </a:solidFill>
@@ -12639,6 +12660,13 @@
   <p:clrMapOvr>
     <a:masterClrMapping/>
   </p:clrMapOvr>
+  <p:timing>
+    <p:tnLst>
+      <p:par>
+        <p:cTn id="1" dur="indefinite" restart="never" nodeType="tmRoot"/>
+      </p:par>
+    </p:tnLst>
+  </p:timing>
 </p:sld>
 </file>
 
@@ -12747,7 +12775,7 @@
               </a:spcBef>
             </a:pPr>
             <a:r>
-              <a:rPr lang="en-US"/>
+              <a:rPr lang="en-US" dirty="0"/>
               <a:t>We've "loaded" the data from our chosen website into the </a:t>
             </a:r>
             <a:r>
@@ -12755,9 +12783,14 @@
               <a:t>R </a:t>
             </a:r>
             <a:r>
-              <a:rPr lang="en-US"/>
+              <a:rPr lang="en-US" i="1" smtClean="0"/>
+              <a:t> </a:t>
+            </a:r>
+            <a:r>
+              <a:rPr lang="en-US" smtClean="0"/>
               <a:t>environment</a:t>
             </a:r>
+            <a:endParaRPr lang="en-US" dirty="0"/>
           </a:p>
           <a:p>
             <a:pPr marL="914400" marR="0" lvl="1" indent="-228600" algn="l" rtl="0">
@@ -12769,11 +12802,11 @@
               </a:spcBef>
             </a:pPr>
             <a:r>
-              <a:rPr lang="en-US"/>
+              <a:rPr lang="en-US" dirty="0"/>
               <a:t>Not a reliable way to warehouse. Why?</a:t>
             </a:r>
             <a:r>
-              <a:rPr lang="en-US" i="1"/>
+              <a:rPr lang="en-US" i="1" dirty="0"/>
               <a:t> Low permanence</a:t>
             </a:r>
           </a:p>
@@ -12784,7 +12817,7 @@
               </a:spcBef>
             </a:pPr>
             <a:r>
-              <a:rPr lang="en-US"/>
+              <a:rPr lang="en-US" dirty="0"/>
               <a:t> Also not a great publication /  communication platform</a:t>
             </a:r>
           </a:p>
@@ -12798,7 +12831,7 @@
               </a:spcBef>
             </a:pPr>
             <a:r>
-              <a:rPr lang="en-US"/>
+              <a:rPr lang="en-US" dirty="0"/>
               <a:t>In a more complete information or business system, we would: </a:t>
             </a:r>
           </a:p>
@@ -12812,7 +12845,7 @@
               </a:spcBef>
             </a:pPr>
             <a:r>
-              <a:rPr lang="en-US"/>
+              <a:rPr lang="en-US" dirty="0"/>
               <a:t>Perform further transformations</a:t>
             </a:r>
           </a:p>
@@ -12826,15 +12859,15 @@
               </a:spcBef>
             </a:pPr>
             <a:r>
-              <a:rPr lang="en-US"/>
+              <a:rPr lang="en-US" dirty="0"/>
               <a:t>Load into database with well-defined schema (</a:t>
             </a:r>
             <a:r>
-              <a:rPr lang="en-US" i="1"/>
+              <a:rPr lang="en-US" i="1" dirty="0"/>
               <a:t>higher permanence</a:t>
             </a:r>
             <a:r>
-              <a:rPr lang="en-US"/>
+              <a:rPr lang="en-US" dirty="0"/>
               <a:t>)</a:t>
             </a:r>
           </a:p>
@@ -12848,7 +12881,7 @@
               </a:spcBef>
             </a:pPr>
             <a:r>
-              <a:rPr lang="en-US"/>
+              <a:rPr lang="en-US" dirty="0"/>
               <a:t>We're skipping that today</a:t>
             </a:r>
           </a:p>
@@ -12859,6 +12892,13 @@
   <p:clrMapOvr>
     <a:masterClrMapping/>
   </p:clrMapOvr>
+  <p:timing>
+    <p:tnLst>
+      <p:par>
+        <p:cTn id="1" dur="indefinite" restart="never" nodeType="tmRoot"/>
+      </p:par>
+    </p:tnLst>
+  </p:timing>
 </p:sld>
 </file>
 
@@ -13046,6 +13086,13 @@
   <p:clrMapOvr>
     <a:masterClrMapping/>
   </p:clrMapOvr>
+  <p:timing>
+    <p:tnLst>
+      <p:par>
+        <p:cTn id="1" dur="indefinite" restart="never" nodeType="tmRoot"/>
+      </p:par>
+    </p:tnLst>
+  </p:timing>
 </p:sld>
 </file>
 
@@ -13325,9 +13372,14 @@
               <a:buNone/>
             </a:pPr>
             <a:r>
-              <a:rPr lang="en-US"/>
-              <a:t>Our process so far</a:t>
-            </a:r>
+              <a:rPr lang="en-US" dirty="0"/>
+              <a:t>Our process so </a:t>
+            </a:r>
+            <a:r>
+              <a:rPr lang="en-US" dirty="0" smtClean="0"/>
+              <a:t>far &amp; next step</a:t>
+            </a:r>
+            <a:endParaRPr lang="en-US" dirty="0"/>
           </a:p>
         </p:txBody>
       </p:sp>
@@ -13513,7 +13565,7 @@
               <a:buNone/>
             </a:pPr>
             <a:r>
-              <a:rPr lang="en-US" sz="3000">
+              <a:rPr lang="en-US" sz="3000" dirty="0">
                 <a:solidFill>
                   <a:srgbClr val="EFEFEF"/>
                 </a:solidFill>
@@ -13529,7 +13581,7 @@
               <a:buNone/>
             </a:pPr>
             <a:r>
-              <a:rPr lang="en-US" sz="2400">
+              <a:rPr lang="en-US" sz="2400" dirty="0">
                 <a:solidFill>
                   <a:srgbClr val="EFEFEF"/>
                 </a:solidFill>
@@ -13616,9 +13668,9 @@
           <a:noFill/>
           <a:ln w="9525" cap="flat" cmpd="sng">
             <a:solidFill>
-              <a:schemeClr val="dk2"/>
+              <a:srgbClr val="FF0000"/>
             </a:solidFill>
-            <a:prstDash val="solid"/>
+            <a:prstDash val="sysDash"/>
             <a:round/>
             <a:headEnd type="none" w="lg" len="lg"/>
             <a:tailEnd type="triangle" w="lg" len="lg"/>
@@ -13676,6 +13728,13 @@
   <p:clrMapOvr>
     <a:masterClrMapping/>
   </p:clrMapOvr>
+  <p:timing>
+    <p:tnLst>
+      <p:par>
+        <p:cTn id="1" dur="indefinite" restart="never" nodeType="tmRoot"/>
+      </p:par>
+    </p:tnLst>
+  </p:timing>
 </p:sld>
 </file>
 
@@ -13751,6 +13810,13 @@
   <p:clrMapOvr>
     <a:masterClrMapping/>
   </p:clrMapOvr>
+  <p:timing>
+    <p:tnLst>
+      <p:par>
+        <p:cTn id="1" dur="indefinite" restart="never" nodeType="tmRoot"/>
+      </p:par>
+    </p:tnLst>
+  </p:timing>
 </p:sld>
 </file>
 
@@ -13780,6 +13846,17 @@
         <p:blipFill>
           <a:blip r:embed="rId3">
             <a:alphaModFix/>
+            <a:extLst>
+              <a:ext uri="{BEBA8EAE-BF5A-486C-A8C5-ECC9F3942E4B}">
+                <a14:imgProps xmlns:a14="http://schemas.microsoft.com/office/drawing/2010/main">
+                  <a14:imgLayer r:embed="rId4">
+                    <a14:imgEffect>
+                      <a14:artisticGlass/>
+                    </a14:imgEffect>
+                  </a14:imgLayer>
+                </a14:imgProps>
+              </a:ext>
+            </a:extLst>
           </a:blip>
           <a:stretch>
             <a:fillRect/>
@@ -13825,9 +13902,6 @@
           <a:lstStyle/>
           <a:p>
             <a:pPr marL="0" marR="0" lvl="0" indent="0" algn="ctr" rtl="0">
-              <a:lnSpc>
-                <a:spcPct val="120000"/>
-              </a:lnSpc>
               <a:spcBef>
                 <a:spcPts val="0"/>
               </a:spcBef>
@@ -13835,7 +13909,7 @@
               <a:buNone/>
             </a:pPr>
             <a:r>
-              <a:rPr lang="en-US" sz="15000">
+              <a:rPr lang="en-US" sz="12500" dirty="0" smtClean="0">
                 <a:solidFill>
                   <a:srgbClr val="666666"/>
                 </a:solidFill>
@@ -13844,7 +13918,31 @@
                 <a:cs typeface="Cabin"/>
                 <a:sym typeface="Cabin"/>
               </a:rPr>
-              <a:t>Practical Exercise 2</a:t>
+              <a:t>“Homework”</a:t>
+            </a:r>
+            <a:r>
+              <a:rPr lang="en-US" sz="15000" dirty="0" smtClean="0">
+                <a:solidFill>
+                  <a:srgbClr val="666666"/>
+                </a:solidFill>
+                <a:latin typeface="Cabin"/>
+                <a:ea typeface="Cabin"/>
+                <a:cs typeface="Cabin"/>
+                <a:sym typeface="Cabin"/>
+              </a:rPr>
+              <a:t> </a:t>
+            </a:r>
+            <a:r>
+              <a:rPr lang="en-US" sz="15000" dirty="0">
+                <a:solidFill>
+                  <a:srgbClr val="666666"/>
+                </a:solidFill>
+                <a:latin typeface="Cabin"/>
+                <a:ea typeface="Cabin"/>
+                <a:cs typeface="Cabin"/>
+                <a:sym typeface="Cabin"/>
+              </a:rPr>
+              <a:t>Exercise 2</a:t>
             </a:r>
           </a:p>
         </p:txBody>
@@ -13946,19 +14044,19 @@
             </a:r>
             <a:r>
               <a:rPr lang="en-US" sz="2400" b="1" dirty="0" smtClean="0">
-                <a:hlinkClick r:id="rId4"/>
+                <a:hlinkClick r:id="rId5"/>
               </a:rPr>
               <a:t>https</a:t>
             </a:r>
             <a:r>
               <a:rPr lang="en-US" sz="2400" b="1" dirty="0">
-                <a:hlinkClick r:id="rId4"/>
+                <a:hlinkClick r:id="rId5"/>
               </a:rPr>
               <a:t>://</a:t>
             </a:r>
             <a:r>
               <a:rPr lang="en-US" sz="2400" b="1" dirty="0" smtClean="0">
-                <a:hlinkClick r:id="rId4"/>
+                <a:hlinkClick r:id="rId5"/>
               </a:rPr>
               <a:t>goo.gl/z6OqUS</a:t>
             </a:r>
@@ -14221,6 +14319,13 @@
   <p:clrMapOvr>
     <a:masterClrMapping/>
   </p:clrMapOvr>
+  <p:timing>
+    <p:tnLst>
+      <p:par>
+        <p:cTn id="1" dur="indefinite" restart="never" nodeType="tmRoot"/>
+      </p:par>
+    </p:tnLst>
+  </p:timing>
 </p:sld>
 </file>
 
@@ -14270,7 +14375,7 @@
           </a:bodyPr>
           <a:lstStyle/>
           <a:p>
-            <a:pPr marL="0" marR="0" lvl="0" indent="0" algn="l" rtl="0">
+            <a:pPr marL="0" marR="0" lvl="0" indent="0" algn="ctr" rtl="0">
               <a:lnSpc>
                 <a:spcPct val="90000"/>
               </a:lnSpc>
@@ -14285,14 +14390,25 @@
               <a:buNone/>
             </a:pPr>
             <a:r>
-              <a:rPr lang="en-US" sz="4000" dirty="0"/>
+              <a:rPr lang="en-US" dirty="0"/>
               <a:t>Our </a:t>
             </a:r>
             <a:r>
-              <a:rPr lang="en-US" sz="4000" dirty="0" smtClean="0"/>
-              <a:t>finished network of processes</a:t>
-            </a:r>
-            <a:endParaRPr lang="en-US" sz="4000" dirty="0"/>
+              <a:rPr lang="en-US" dirty="0" smtClean="0"/>
+              <a:t>finished network of </a:t>
+            </a:r>
+            <a:r>
+              <a:rPr lang="en-US" dirty="0" smtClean="0"/>
+              <a:t/>
+            </a:r>
+            <a:br>
+              <a:rPr lang="en-US" dirty="0" smtClean="0"/>
+            </a:br>
+            <a:r>
+              <a:rPr lang="en-US" dirty="0" smtClean="0"/>
+              <a:t>continuous processes</a:t>
+            </a:r>
+            <a:endParaRPr lang="en-US" dirty="0"/>
           </a:p>
         </p:txBody>
       </p:sp>
@@ -14457,7 +14573,7 @@
         </p:nvSpPr>
         <p:spPr>
           <a:xfrm>
-            <a:off x="5572826" y="1996362"/>
+            <a:off x="5470212" y="1996362"/>
             <a:ext cx="1372161" cy="990576"/>
           </a:xfrm>
           <a:prstGeom prst="rect">
@@ -14602,13 +14718,13 @@
         </p:nvCxnSpPr>
         <p:spPr>
           <a:xfrm rot="16200000" flipH="1" flipV="1">
-            <a:off x="3915191" y="1911039"/>
-            <a:ext cx="188740" cy="972479"/>
+            <a:off x="3931024" y="1937962"/>
+            <a:ext cx="199829" cy="929722"/>
           </a:xfrm>
           <a:prstGeom prst="bentConnector4">
             <a:avLst>
-              <a:gd name="adj1" fmla="val -121119"/>
-              <a:gd name="adj2" fmla="val 85260"/>
+              <a:gd name="adj1" fmla="val -114398"/>
+              <a:gd name="adj2" fmla="val 86882"/>
             </a:avLst>
           </a:prstGeom>
           <a:ln>
@@ -14643,7 +14759,7 @@
         </p:nvSpPr>
         <p:spPr>
           <a:xfrm>
-            <a:off x="1865557" y="2007449"/>
+            <a:off x="1908314" y="2018538"/>
             <a:ext cx="1657764" cy="968400"/>
           </a:xfrm>
           <a:prstGeom prst="flowChartDecision">
@@ -14693,8 +14809,8 @@
         </p:nvCxnSpPr>
         <p:spPr>
           <a:xfrm rot="5400000">
-            <a:off x="1424152" y="3001104"/>
-            <a:ext cx="1295542" cy="1245033"/>
+            <a:off x="1451075" y="2985269"/>
+            <a:ext cx="1284453" cy="1287790"/>
           </a:xfrm>
           <a:prstGeom prst="bentConnector3">
             <a:avLst/>
@@ -14734,9 +14850,9 @@
           <p:nvPr/>
         </p:nvCxnSpPr>
         <p:spPr>
-          <a:xfrm flipH="1">
-            <a:off x="1663150" y="2491649"/>
-            <a:ext cx="202407" cy="1"/>
+          <a:xfrm flipH="1" flipV="1">
+            <a:off x="1663150" y="2491650"/>
+            <a:ext cx="245164" cy="11088"/>
           </a:xfrm>
           <a:prstGeom prst="straightConnector1">
             <a:avLst/>
@@ -14880,7 +14996,7 @@
             </a:pPr>
             <a:r>
               <a:rPr lang="en-US" sz="2000" dirty="0" smtClean="0"/>
-              <a:t>(JSON)</a:t>
+              <a:t>(JSON in “/data”)</a:t>
             </a:r>
             <a:endParaRPr lang="en-US" sz="2000" dirty="0"/>
           </a:p>
@@ -14999,8 +15115,8 @@
         </p:nvCxnSpPr>
         <p:spPr>
           <a:xfrm rot="5400000">
-            <a:off x="5791236" y="3132409"/>
-            <a:ext cx="613143" cy="322201"/>
+            <a:off x="5739929" y="3183716"/>
+            <a:ext cx="613143" cy="219587"/>
           </a:xfrm>
           <a:prstGeom prst="bentConnector3">
             <a:avLst>
@@ -15040,7 +15156,7 @@
         </p:nvSpPr>
         <p:spPr>
           <a:xfrm>
-            <a:off x="5572825" y="5181624"/>
+            <a:off x="5470213" y="5181626"/>
             <a:ext cx="1372161" cy="990576"/>
           </a:xfrm>
           <a:prstGeom prst="rect">
@@ -15422,19 +15538,20 @@
         <p:nvCxnSpPr>
           <p:cNvPr id="64" name="Elbow Connector 63"/>
           <p:cNvCxnSpPr>
-            <a:stCxn id="90" idx="3"/>
+            <a:stCxn id="90" idx="0"/>
             <a:endCxn id="331" idx="3"/>
           </p:cNvCxnSpPr>
           <p:nvPr/>
         </p:nvCxnSpPr>
         <p:spPr>
-          <a:xfrm flipV="1">
-            <a:off x="6944986" y="2491650"/>
-            <a:ext cx="1" cy="3185262"/>
-          </a:xfrm>
-          <a:prstGeom prst="bentConnector3">
+          <a:xfrm rot="5400000" flipH="1" flipV="1">
+            <a:off x="5154345" y="3493599"/>
+            <a:ext cx="2689976" cy="686079"/>
+          </a:xfrm>
+          <a:prstGeom prst="bentConnector4">
             <a:avLst>
-              <a:gd name="adj1" fmla="val 22860100000"/>
+              <a:gd name="adj1" fmla="val 19710"/>
+              <a:gd name="adj2" fmla="val 133320"/>
             </a:avLst>
           </a:prstGeom>
           <a:ln>
@@ -15444,7 +15561,7 @@
               </a:schemeClr>
             </a:solidFill>
             <a:headEnd type="triangle"/>
-            <a:tailEnd type="triangle"/>
+            <a:tailEnd type="none"/>
           </a:ln>
         </p:spPr>
         <p:style>
@@ -15470,7 +15587,7 @@
         </p:nvSpPr>
         <p:spPr>
           <a:xfrm>
-            <a:off x="7391397" y="4478284"/>
+            <a:off x="7543800" y="4542560"/>
             <a:ext cx="1372161" cy="990576"/>
           </a:xfrm>
           <a:prstGeom prst="rect">
@@ -15525,7 +15642,7 @@
         </p:nvSpPr>
         <p:spPr>
           <a:xfrm>
-            <a:off x="7391396" y="3157657"/>
+            <a:off x="7543800" y="3280816"/>
             <a:ext cx="1372161" cy="990576"/>
           </a:xfrm>
           <a:prstGeom prst="rect">
@@ -15576,18 +15693,21 @@
         <p:nvCxnSpPr>
           <p:cNvPr id="66" name="Elbow Connector 65"/>
           <p:cNvCxnSpPr>
-            <a:stCxn id="90" idx="0"/>
+            <a:stCxn id="90" idx="2"/>
             <a:endCxn id="110" idx="1"/>
           </p:cNvCxnSpPr>
           <p:nvPr/>
         </p:nvCxnSpPr>
         <p:spPr>
           <a:xfrm rot="5400000" flipH="1" flipV="1">
-            <a:off x="6721125" y="4511353"/>
-            <a:ext cx="208052" cy="1132491"/>
-          </a:xfrm>
-          <a:prstGeom prst="bentConnector2">
-            <a:avLst/>
+            <a:off x="6282870" y="4911272"/>
+            <a:ext cx="1134354" cy="1387506"/>
+          </a:xfrm>
+          <a:prstGeom prst="bentConnector4">
+            <a:avLst>
+              <a:gd name="adj1" fmla="val -20152"/>
+              <a:gd name="adj2" fmla="val 91407"/>
+            </a:avLst>
           </a:prstGeom>
           <a:ln>
             <a:solidFill>
@@ -15622,7 +15742,7 @@
         </p:nvSpPr>
         <p:spPr>
           <a:xfrm>
-            <a:off x="6233755" y="4665795"/>
+            <a:off x="6765164" y="6097175"/>
             <a:ext cx="702436" cy="307777"/>
           </a:xfrm>
           <a:prstGeom prst="rect">
@@ -15652,20 +15772,19 @@
         <p:nvCxnSpPr>
           <p:cNvPr id="68" name="Elbow Connector 67"/>
           <p:cNvCxnSpPr>
-            <a:stCxn id="90" idx="2"/>
-            <a:endCxn id="111" idx="3"/>
+            <a:stCxn id="90" idx="3"/>
+            <a:endCxn id="111" idx="1"/>
           </p:cNvCxnSpPr>
           <p:nvPr/>
         </p:nvCxnSpPr>
         <p:spPr>
-          <a:xfrm rot="5400000" flipH="1" flipV="1">
-            <a:off x="6251603" y="3660247"/>
-            <a:ext cx="2519255" cy="2504651"/>
-          </a:xfrm>
-          <a:prstGeom prst="bentConnector4">
+          <a:xfrm flipV="1">
+            <a:off x="6842374" y="3776104"/>
+            <a:ext cx="701426" cy="1900810"/>
+          </a:xfrm>
+          <a:prstGeom prst="bentConnector3">
             <a:avLst>
-              <a:gd name="adj1" fmla="val -9074"/>
-              <a:gd name="adj2" fmla="val 109127"/>
+              <a:gd name="adj1" fmla="val 56600"/>
             </a:avLst>
           </a:prstGeom>
           <a:ln>
@@ -15703,12 +15822,12 @@
         </p:nvCxnSpPr>
         <p:spPr>
           <a:xfrm rot="16200000" flipV="1">
-            <a:off x="6587545" y="1667725"/>
-            <a:ext cx="1161295" cy="1818570"/>
+            <a:off x="6550860" y="1601795"/>
+            <a:ext cx="1284454" cy="2073588"/>
           </a:xfrm>
           <a:prstGeom prst="bentConnector3">
             <a:avLst>
-              <a:gd name="adj1" fmla="val 119685"/>
+              <a:gd name="adj1" fmla="val 117797"/>
             </a:avLst>
           </a:prstGeom>
           <a:ln>
@@ -15746,12 +15865,12 @@
         </p:nvCxnSpPr>
         <p:spPr>
           <a:xfrm rot="10800000" flipH="1">
-            <a:off x="5572824" y="4568482"/>
-            <a:ext cx="363881" cy="1108431"/>
+            <a:off x="5470212" y="4568482"/>
+            <a:ext cx="466493" cy="1108433"/>
           </a:xfrm>
           <a:prstGeom prst="bentConnector4">
             <a:avLst>
-              <a:gd name="adj1" fmla="val -62823"/>
+              <a:gd name="adj1" fmla="val -49004"/>
               <a:gd name="adj2" fmla="val 72342"/>
             </a:avLst>
           </a:prstGeom>
@@ -15833,6 +15952,13 @@
   <p:clrMapOvr>
     <a:masterClrMapping/>
   </p:clrMapOvr>
+  <p:timing>
+    <p:tnLst>
+      <p:par>
+        <p:cTn id="1" dur="indefinite" restart="never" nodeType="tmRoot"/>
+      </p:par>
+    </p:tnLst>
+  </p:timing>
 </p:sld>
 </file>
 
@@ -15962,6 +16088,13 @@
   <p:transition spd="slow">
     <p:fade/>
   </p:transition>
+  <p:timing>
+    <p:tnLst>
+      <p:par>
+        <p:cTn id="1" dur="indefinite" restart="never" nodeType="tmRoot"/>
+      </p:par>
+    </p:tnLst>
+  </p:timing>
 </p:sld>
 </file>
 
@@ -16095,6 +16228,13 @@
   <p:clrMapOvr>
     <a:masterClrMapping/>
   </p:clrMapOvr>
+  <p:timing>
+    <p:tnLst>
+      <p:par>
+        <p:cTn id="1" dur="indefinite" restart="never" nodeType="tmRoot"/>
+      </p:par>
+    </p:tnLst>
+  </p:timing>
 </p:sld>
 </file>
 
@@ -16529,8 +16669,16 @@
               <a:buNone/>
             </a:pPr>
             <a:r>
-              <a:rPr lang="en-US"/>
-              <a:t>"Data Scientist (n.): Person who is better at statistics than any software engineer and better at software engineering than any statistician."   - Josh Wills </a:t>
+              <a:rPr lang="en-US" dirty="0"/>
+              <a:t>"Data Scientist (n.): Person who is better at statistics than any software engineer and better at software engineering than any statistician." </a:t>
+            </a:r>
+            <a:r>
+              <a:rPr lang="en-US" sz="2000" dirty="0" smtClean="0"/>
+              <a:t>- </a:t>
+            </a:r>
+            <a:r>
+              <a:rPr lang="en-US" sz="2000" dirty="0"/>
+              <a:t>Josh Wills </a:t>
             </a:r>
           </a:p>
           <a:p>
@@ -16543,7 +16691,19 @@
               </a:spcBef>
               <a:buNone/>
             </a:pPr>
-            <a:endParaRPr/>
+            <a:endParaRPr lang="en-US" dirty="0" smtClean="0"/>
+          </a:p>
+          <a:p>
+            <a:pPr marL="0" marR="0" lvl="0" indent="0" algn="l" rtl="0">
+              <a:lnSpc>
+                <a:spcPct val="90000"/>
+              </a:lnSpc>
+              <a:spcBef>
+                <a:spcPts val="0"/>
+              </a:spcBef>
+              <a:buNone/>
+            </a:pPr>
+            <a:endParaRPr dirty="0"/>
           </a:p>
           <a:p>
             <a:pPr marL="457200" marR="0" lvl="0" indent="-228600" algn="l" rtl="0">
@@ -16555,7 +16715,7 @@
               </a:spcBef>
             </a:pPr>
             <a:r>
-              <a:rPr lang="en-US"/>
+              <a:rPr lang="en-US" dirty="0"/>
               <a:t>Something of a marketing term, but careers and formal data science programs have sprung up around the concept</a:t>
             </a:r>
           </a:p>

</xml_diff>

<commit_message>
Update for opacity and fill
</commit_message>
<xml_diff>
--- a/Visual Data Science.pptx
+++ b/Visual Data Science.pptx
@@ -47,14 +47,14 @@
       <p:boldItalic r:id="rId33"/>
     </p:embeddedFont>
     <p:embeddedFont>
-      <p:font typeface="Open Sans" panose="020B0604020202020204" charset="0"/>
+      <p:font typeface="Cabin" panose="020B0604020202020204" charset="0"/>
       <p:regular r:id="rId34"/>
       <p:bold r:id="rId35"/>
       <p:italic r:id="rId36"/>
       <p:boldItalic r:id="rId37"/>
     </p:embeddedFont>
     <p:embeddedFont>
-      <p:font typeface="Cabin" panose="020B0604020202020204" charset="0"/>
+      <p:font typeface="Open Sans" panose="020B0604020202020204" charset="0"/>
       <p:regular r:id="rId38"/>
       <p:bold r:id="rId39"/>
       <p:italic r:id="rId40"/>
@@ -13816,23 +13816,8 @@
                 </a:solidFill>
                 <a:sym typeface="Cabin"/>
               </a:rPr>
-              <a:t>[</a:t>
-            </a:r>
-            <a:r>
-              <a:rPr lang="en-US" sz="4400" b="0" i="0" u="none" cap="none" dirty="0" smtClean="0">
-                <a:solidFill>
-                  <a:schemeClr val="lt1"/>
-                </a:solidFill>
-                <a:sym typeface="Cabin"/>
-              </a:rPr>
-              <a:t>demonstration]</a:t>
-            </a:r>
-            <a:endParaRPr lang="en-US" sz="4400" b="0" i="0" u="none" cap="none" dirty="0" smtClean="0">
-              <a:solidFill>
-                <a:schemeClr val="lt1"/>
-              </a:solidFill>
-              <a:sym typeface="Cabin"/>
-            </a:endParaRPr>
+              <a:t>[demonstration]</a:t>
+            </a:r>
           </a:p>
         </p:txBody>
       </p:sp>
@@ -14040,19 +14025,7 @@
                 <a:cs typeface="Open Sans"/>
                 <a:sym typeface="Open Sans"/>
               </a:rPr>
-              <a:t> clone/</a:t>
-            </a:r>
-            <a:r>
-              <a:rPr lang="en-US" sz="2400" b="1" dirty="0" smtClean="0">
-                <a:solidFill>
-                  <a:srgbClr val="4A86E8"/>
-                </a:solidFill>
-                <a:latin typeface="Open Sans"/>
-                <a:ea typeface="Open Sans"/>
-                <a:cs typeface="Open Sans"/>
-                <a:sym typeface="Open Sans"/>
-              </a:rPr>
-              <a:t>DL </a:t>
+              <a:t> clone/DL </a:t>
             </a:r>
             <a:r>
               <a:rPr lang="en-US" sz="2400" b="1" dirty="0" err="1" smtClean="0">
@@ -14188,6 +14161,30 @@
                 <a:sym typeface="Open Sans"/>
               </a:rPr>
               <a:t>Bind.R</a:t>
+            </a:r>
+            <a:r>
+              <a:rPr lang="en-US" sz="2400" b="1" dirty="0" smtClean="0">
+                <a:solidFill>
+                  <a:srgbClr val="4A86E8"/>
+                </a:solidFill>
+                <a:latin typeface="Open Sans"/>
+                <a:ea typeface="Open Sans"/>
+                <a:cs typeface="Open Sans"/>
+                <a:sym typeface="Open Sans"/>
+              </a:rPr>
+              <a:t> and </a:t>
+            </a:r>
+            <a:r>
+              <a:rPr lang="en-US" sz="2400" b="1" dirty="0" err="1" smtClean="0">
+                <a:solidFill>
+                  <a:srgbClr val="4A86E8"/>
+                </a:solidFill>
+                <a:latin typeface="Open Sans"/>
+                <a:ea typeface="Open Sans"/>
+                <a:cs typeface="Open Sans"/>
+                <a:sym typeface="Open Sans"/>
+              </a:rPr>
+              <a:t>serv.R</a:t>
             </a:r>
             <a:endParaRPr lang="en-US" sz="2400" b="1" dirty="0" smtClean="0">
               <a:solidFill>

</xml_diff>